<commit_message>
Slight updates to ppt
</commit_message>
<xml_diff>
--- a/Intro_to_R/Introduction to R.pptx
+++ b/Intro_to_R/Introduction to R.pptx
@@ -6,7 +6,7 @@
     <p:sldMasterId id="2147483692" r:id="rId2"/>
   </p:sldMasterIdLst>
   <p:notesMasterIdLst>
-    <p:notesMasterId r:id="rId25"/>
+    <p:notesMasterId r:id="rId26"/>
   </p:notesMasterIdLst>
   <p:sldIdLst>
     <p:sldId id="283" r:id="rId3"/>
@@ -30,7 +30,8 @@
     <p:sldId id="351" r:id="rId21"/>
     <p:sldId id="359" r:id="rId22"/>
     <p:sldId id="361" r:id="rId23"/>
-    <p:sldId id="358" r:id="rId24"/>
+    <p:sldId id="362" r:id="rId24"/>
+    <p:sldId id="358" r:id="rId25"/>
   </p:sldIdLst>
   <p:sldSz cx="12192000" cy="6858000"/>
   <p:notesSz cx="6858000" cy="9144000"/>
@@ -219,7 +220,7 @@
           <a:p>
             <a:fld id="{85B0B4E8-A216-4834-BA1C-6A7DAFED7374}" type="datetimeFigureOut">
               <a:rPr lang="en-US" smtClean="0"/>
-              <a:t>11/6/2018</a:t>
+              <a:t>11/7/2018</a:t>
             </a:fld>
             <a:endParaRPr lang="en-US"/>
           </a:p>
@@ -727,7 +728,7 @@
           <a:p>
             <a:fld id="{C272A757-42F3-4527-9C1E-C8A1E1019F33}" type="datetimeFigureOut">
               <a:rPr lang="en-US" smtClean="0"/>
-              <a:t>11/6/2018</a:t>
+              <a:t>11/7/2018</a:t>
             </a:fld>
             <a:endParaRPr lang="en-US"/>
           </a:p>
@@ -897,7 +898,7 @@
           <a:p>
             <a:fld id="{C272A757-42F3-4527-9C1E-C8A1E1019F33}" type="datetimeFigureOut">
               <a:rPr lang="en-US" smtClean="0"/>
-              <a:t>11/6/2018</a:t>
+              <a:t>11/7/2018</a:t>
             </a:fld>
             <a:endParaRPr lang="en-US"/>
           </a:p>
@@ -1077,7 +1078,7 @@
           <a:p>
             <a:fld id="{C272A757-42F3-4527-9C1E-C8A1E1019F33}" type="datetimeFigureOut">
               <a:rPr lang="en-US" smtClean="0"/>
-              <a:t>11/6/2018</a:t>
+              <a:t>11/7/2018</a:t>
             </a:fld>
             <a:endParaRPr lang="en-US"/>
           </a:p>
@@ -1548,7 +1549,7 @@
             <a:fld id="{8ACDB3CC-F982-40F9-8DD6-BCC9AFBF44BD}" type="datetime1">
               <a:rPr lang="en-US" smtClean="0"/>
               <a:pPr/>
-              <a:t>11/6/2018</a:t>
+              <a:t>11/7/2018</a:t>
             </a:fld>
             <a:endParaRPr lang="en-US" dirty="0"/>
           </a:p>
@@ -1718,7 +1719,7 @@
           <a:p>
             <a:fld id="{68C2560D-EC28-3B41-86E8-18F1CE0113B4}" type="datetimeFigureOut">
               <a:rPr lang="en-US" smtClean="0"/>
-              <a:t>11/6/2018</a:t>
+              <a:t>11/7/2018</a:t>
             </a:fld>
             <a:endParaRPr lang="en-US"/>
           </a:p>
@@ -1965,7 +1966,7 @@
             <a:fld id="{4A9E7B99-7C3F-4BC3-B7B8-7E1F8C620B24}" type="datetime1">
               <a:rPr lang="en-US" smtClean="0"/>
               <a:pPr/>
-              <a:t>11/6/2018</a:t>
+              <a:t>11/7/2018</a:t>
             </a:fld>
             <a:endParaRPr lang="en-US"/>
           </a:p>
@@ -2259,7 +2260,7 @@
           <a:p>
             <a:fld id="{68C2560D-EC28-3B41-86E8-18F1CE0113B4}" type="datetimeFigureOut">
               <a:rPr lang="en-US" smtClean="0"/>
-              <a:t>11/6/2018</a:t>
+              <a:t>11/7/2018</a:t>
             </a:fld>
             <a:endParaRPr lang="en-US"/>
           </a:p>
@@ -2686,7 +2687,7 @@
           <a:p>
             <a:fld id="{68C2560D-EC28-3B41-86E8-18F1CE0113B4}" type="datetimeFigureOut">
               <a:rPr lang="en-US" smtClean="0"/>
-              <a:t>11/6/2018</a:t>
+              <a:t>11/7/2018</a:t>
             </a:fld>
             <a:endParaRPr lang="en-US"/>
           </a:p>
@@ -2804,7 +2805,7 @@
           <a:p>
             <a:fld id="{68C2560D-EC28-3B41-86E8-18F1CE0113B4}" type="datetimeFigureOut">
               <a:rPr lang="en-US" smtClean="0"/>
-              <a:t>11/6/2018</a:t>
+              <a:t>11/7/2018</a:t>
             </a:fld>
             <a:endParaRPr lang="en-US"/>
           </a:p>
@@ -2899,7 +2900,7 @@
           <a:p>
             <a:fld id="{68C2560D-EC28-3B41-86E8-18F1CE0113B4}" type="datetimeFigureOut">
               <a:rPr lang="en-US" smtClean="0"/>
-              <a:t>11/6/2018</a:t>
+              <a:t>11/7/2018</a:t>
             </a:fld>
             <a:endParaRPr lang="en-US"/>
           </a:p>
@@ -3069,7 +3070,7 @@
           <a:p>
             <a:fld id="{C272A757-42F3-4527-9C1E-C8A1E1019F33}" type="datetimeFigureOut">
               <a:rPr lang="en-US" smtClean="0"/>
-              <a:t>11/6/2018</a:t>
+              <a:t>11/7/2018</a:t>
             </a:fld>
             <a:endParaRPr lang="en-US"/>
           </a:p>
@@ -3346,7 +3347,7 @@
           <a:p>
             <a:fld id="{68C2560D-EC28-3B41-86E8-18F1CE0113B4}" type="datetimeFigureOut">
               <a:rPr lang="en-US" smtClean="0"/>
-              <a:t>11/6/2018</a:t>
+              <a:t>11/7/2018</a:t>
             </a:fld>
             <a:endParaRPr lang="en-US"/>
           </a:p>
@@ -3606,7 +3607,7 @@
           <a:p>
             <a:fld id="{68C2560D-EC28-3B41-86E8-18F1CE0113B4}" type="datetimeFigureOut">
               <a:rPr lang="en-US" smtClean="0"/>
-              <a:t>11/6/2018</a:t>
+              <a:t>11/7/2018</a:t>
             </a:fld>
             <a:endParaRPr lang="en-US"/>
           </a:p>
@@ -3776,7 +3777,7 @@
           <a:p>
             <a:fld id="{68C2560D-EC28-3B41-86E8-18F1CE0113B4}" type="datetimeFigureOut">
               <a:rPr lang="en-US" smtClean="0"/>
-              <a:t>11/6/2018</a:t>
+              <a:t>11/7/2018</a:t>
             </a:fld>
             <a:endParaRPr lang="en-US"/>
           </a:p>
@@ -3956,7 +3957,7 @@
           <a:p>
             <a:fld id="{68C2560D-EC28-3B41-86E8-18F1CE0113B4}" type="datetimeFigureOut">
               <a:rPr lang="en-US" smtClean="0"/>
-              <a:t>11/6/2018</a:t>
+              <a:t>11/7/2018</a:t>
             </a:fld>
             <a:endParaRPr lang="en-US"/>
           </a:p>
@@ -4202,7 +4203,7 @@
           <a:p>
             <a:fld id="{C272A757-42F3-4527-9C1E-C8A1E1019F33}" type="datetimeFigureOut">
               <a:rPr lang="en-US" smtClean="0"/>
-              <a:t>11/6/2018</a:t>
+              <a:t>11/7/2018</a:t>
             </a:fld>
             <a:endParaRPr lang="en-US"/>
           </a:p>
@@ -4434,7 +4435,7 @@
           <a:p>
             <a:fld id="{C272A757-42F3-4527-9C1E-C8A1E1019F33}" type="datetimeFigureOut">
               <a:rPr lang="en-US" smtClean="0"/>
-              <a:t>11/6/2018</a:t>
+              <a:t>11/7/2018</a:t>
             </a:fld>
             <a:endParaRPr lang="en-US"/>
           </a:p>
@@ -4801,7 +4802,7 @@
           <a:p>
             <a:fld id="{C272A757-42F3-4527-9C1E-C8A1E1019F33}" type="datetimeFigureOut">
               <a:rPr lang="en-US" smtClean="0"/>
-              <a:t>11/6/2018</a:t>
+              <a:t>11/7/2018</a:t>
             </a:fld>
             <a:endParaRPr lang="en-US"/>
           </a:p>
@@ -4919,7 +4920,7 @@
           <a:p>
             <a:fld id="{C272A757-42F3-4527-9C1E-C8A1E1019F33}" type="datetimeFigureOut">
               <a:rPr lang="en-US" smtClean="0"/>
-              <a:t>11/6/2018</a:t>
+              <a:t>11/7/2018</a:t>
             </a:fld>
             <a:endParaRPr lang="en-US"/>
           </a:p>
@@ -5014,7 +5015,7 @@
           <a:p>
             <a:fld id="{C272A757-42F3-4527-9C1E-C8A1E1019F33}" type="datetimeFigureOut">
               <a:rPr lang="en-US" smtClean="0"/>
-              <a:t>11/6/2018</a:t>
+              <a:t>11/7/2018</a:t>
             </a:fld>
             <a:endParaRPr lang="en-US"/>
           </a:p>
@@ -5291,7 +5292,7 @@
           <a:p>
             <a:fld id="{C272A757-42F3-4527-9C1E-C8A1E1019F33}" type="datetimeFigureOut">
               <a:rPr lang="en-US" smtClean="0"/>
-              <a:t>11/6/2018</a:t>
+              <a:t>11/7/2018</a:t>
             </a:fld>
             <a:endParaRPr lang="en-US"/>
           </a:p>
@@ -5544,7 +5545,7 @@
           <a:p>
             <a:fld id="{C272A757-42F3-4527-9C1E-C8A1E1019F33}" type="datetimeFigureOut">
               <a:rPr lang="en-US" smtClean="0"/>
-              <a:t>11/6/2018</a:t>
+              <a:t>11/7/2018</a:t>
             </a:fld>
             <a:endParaRPr lang="en-US"/>
           </a:p>
@@ -5757,7 +5758,7 @@
           <a:p>
             <a:fld id="{C272A757-42F3-4527-9C1E-C8A1E1019F33}" type="datetimeFigureOut">
               <a:rPr lang="en-US" smtClean="0"/>
-              <a:t>11/6/2018</a:t>
+              <a:t>11/7/2018</a:t>
             </a:fld>
             <a:endParaRPr lang="en-US"/>
           </a:p>
@@ -6305,7 +6306,7 @@
           <a:p>
             <a:fld id="{68C2560D-EC28-3B41-86E8-18F1CE0113B4}" type="datetimeFigureOut">
               <a:rPr lang="en-US" smtClean="0"/>
-              <a:t>11/6/2018</a:t>
+              <a:t>11/7/2018</a:t>
             </a:fld>
             <a:endParaRPr lang="en-US"/>
           </a:p>
@@ -7031,7 +7032,11 @@
             </a:r>
             <a:r>
               <a:rPr lang="en-US" dirty="0" smtClean="0"/>
-              <a:t>, records, points, cases, samples, instances, etc.</a:t>
+              <a:t>, observations, </a:t>
+            </a:r>
+            <a:r>
+              <a:rPr lang="en-US" dirty="0" smtClean="0"/>
+              <a:t>points, cases, samples, instances, etc.</a:t>
             </a:r>
           </a:p>
         </p:txBody>
@@ -7185,7 +7190,7 @@
           </p:cNvPicPr>
           <p:nvPr/>
         </p:nvPicPr>
-        <p:blipFill>
+        <p:blipFill rotWithShape="1">
           <a:blip r:embed="rId2">
             <a:extLst>
               <a:ext uri="{28A0092B-C50C-407E-A947-70E740481C1C}">
@@ -7193,15 +7198,13 @@
               </a:ext>
             </a:extLst>
           </a:blip>
-          <a:srcRect/>
-          <a:stretch>
-            <a:fillRect/>
-          </a:stretch>
+          <a:srcRect b="53050"/>
+          <a:stretch/>
         </p:blipFill>
         <p:spPr bwMode="auto">
           <a:xfrm>
-            <a:off x="7840133" y="967500"/>
-            <a:ext cx="3936267" cy="4630293"/>
+            <a:off x="7840133" y="3254105"/>
+            <a:ext cx="3936267" cy="2173906"/>
           </a:xfrm>
           <a:prstGeom prst="rect">
             <a:avLst/>
@@ -7249,6 +7252,45 @@
           </a:p>
         </p:txBody>
       </p:sp>
+      <p:pic>
+        <p:nvPicPr>
+          <p:cNvPr id="6" name="Picture 2" descr="https://qph.fs.quoracdn.net/main-qimg-7badb966d5ff6063ddb515737011ed1b-c"/>
+          <p:cNvPicPr>
+            <a:picLocks noChangeAspect="1" noChangeArrowheads="1"/>
+          </p:cNvPicPr>
+          <p:nvPr/>
+        </p:nvPicPr>
+        <p:blipFill rotWithShape="1">
+          <a:blip r:embed="rId2">
+            <a:extLst>
+              <a:ext uri="{28A0092B-C50C-407E-A947-70E740481C1C}">
+                <a14:useLocalDpi xmlns:a14="http://schemas.microsoft.com/office/drawing/2010/main" val="0"/>
+              </a:ext>
+            </a:extLst>
+          </a:blip>
+          <a:srcRect t="45611"/>
+          <a:stretch/>
+        </p:blipFill>
+        <p:spPr bwMode="auto">
+          <a:xfrm>
+            <a:off x="7658464" y="565938"/>
+            <a:ext cx="3936267" cy="2518385"/>
+          </a:xfrm>
+          <a:prstGeom prst="rect">
+            <a:avLst/>
+          </a:prstGeom>
+          <a:noFill/>
+          <a:extLst>
+            <a:ext uri="{909E8E84-426E-40DD-AFC4-6F175D3DCCD1}">
+              <a14:hiddenFill xmlns:a14="http://schemas.microsoft.com/office/drawing/2010/main">
+                <a:solidFill>
+                  <a:srgbClr val="FFFFFF"/>
+                </a:solidFill>
+              </a14:hiddenFill>
+            </a:ext>
+          </a:extLst>
+        </p:spPr>
+      </p:pic>
     </p:spTree>
     <p:extLst>
       <p:ext uri="{BB962C8B-B14F-4D97-AF65-F5344CB8AC3E}">
@@ -9097,7 +9139,7 @@
           <a:p>
             <a:r>
               <a:rPr lang="en-US" dirty="0" smtClean="0"/>
-              <a:t>Online Help/Resources</a:t>
+              <a:t>Additional Online Resources</a:t>
             </a:r>
             <a:endParaRPr lang="en-US" dirty="0"/>
           </a:p>
@@ -9199,6 +9241,170 @@
 </file>
 
 <file path=ppt/slides/slide22.xml><?xml version="1.0" encoding="utf-8"?>
+<p:sld xmlns:a="http://schemas.openxmlformats.org/drawingml/2006/main" xmlns:r="http://schemas.openxmlformats.org/officeDocument/2006/relationships" xmlns:p="http://schemas.openxmlformats.org/presentationml/2006/main">
+  <p:cSld>
+    <p:spTree>
+      <p:nvGrpSpPr>
+        <p:cNvPr id="1" name=""/>
+        <p:cNvGrpSpPr/>
+        <p:nvPr/>
+      </p:nvGrpSpPr>
+      <p:grpSpPr>
+        <a:xfrm>
+          <a:off x="0" y="0"/>
+          <a:ext cx="0" cy="0"/>
+          <a:chOff x="0" y="0"/>
+          <a:chExt cx="0" cy="0"/>
+        </a:xfrm>
+      </p:grpSpPr>
+      <p:sp>
+        <p:nvSpPr>
+          <p:cNvPr id="2" name="Title 1"/>
+          <p:cNvSpPr>
+            <a:spLocks noGrp="1"/>
+          </p:cNvSpPr>
+          <p:nvPr>
+            <p:ph type="title"/>
+          </p:nvPr>
+        </p:nvSpPr>
+        <p:spPr/>
+        <p:txBody>
+          <a:bodyPr>
+            <a:normAutofit fontScale="90000"/>
+          </a:bodyPr>
+          <a:lstStyle/>
+          <a:p>
+            <a:r>
+              <a:rPr lang="en-US" dirty="0" smtClean="0"/>
+              <a:t>UC R User Group</a:t>
+            </a:r>
+            <a:endParaRPr lang="en-US" dirty="0"/>
+          </a:p>
+        </p:txBody>
+      </p:sp>
+      <p:sp>
+        <p:nvSpPr>
+          <p:cNvPr id="3" name="Text Placeholder 2"/>
+          <p:cNvSpPr>
+            <a:spLocks noGrp="1"/>
+          </p:cNvSpPr>
+          <p:nvPr>
+            <p:ph type="body" idx="1"/>
+          </p:nvPr>
+        </p:nvSpPr>
+        <p:spPr/>
+        <p:txBody>
+          <a:bodyPr>
+            <a:normAutofit/>
+          </a:bodyPr>
+          <a:lstStyle/>
+          <a:p>
+            <a:pPr marL="0" indent="0">
+              <a:buNone/>
+            </a:pPr>
+            <a:r>
+              <a:rPr lang="en-US" dirty="0" smtClean="0"/>
+              <a:t>Expected initial meeting </a:t>
+            </a:r>
+            <a:r>
+              <a:rPr lang="en-US" b="1" dirty="0" smtClean="0"/>
+              <a:t>January 2019</a:t>
+            </a:r>
+            <a:r>
+              <a:rPr lang="en-US" dirty="0" smtClean="0"/>
+              <a:t>!</a:t>
+            </a:r>
+          </a:p>
+          <a:p>
+            <a:pPr marL="0" indent="0">
+              <a:buNone/>
+            </a:pPr>
+            <a:endParaRPr lang="en-US" dirty="0"/>
+          </a:p>
+          <a:p>
+            <a:pPr marL="0" indent="0">
+              <a:buNone/>
+            </a:pPr>
+            <a:r>
+              <a:rPr lang="en-US" dirty="0" smtClean="0"/>
+              <a:t>The main goal is to create a community of R users from all levels of experience and variety of academic interests: </a:t>
+            </a:r>
+          </a:p>
+          <a:p>
+            <a:pPr marL="0" indent="0">
+              <a:buNone/>
+            </a:pPr>
+            <a:r>
+              <a:rPr lang="en-US" dirty="0" smtClean="0"/>
+              <a:t> </a:t>
+            </a:r>
+          </a:p>
+          <a:p>
+            <a:pPr lvl="1"/>
+            <a:r>
+              <a:rPr lang="en-US" dirty="0" smtClean="0"/>
+              <a:t>Events &amp; Workshops</a:t>
+            </a:r>
+          </a:p>
+          <a:p>
+            <a:pPr lvl="1"/>
+            <a:r>
+              <a:rPr lang="en-US" dirty="0" smtClean="0"/>
+              <a:t>Monthly challenges (prizes!)</a:t>
+            </a:r>
+          </a:p>
+          <a:p>
+            <a:pPr lvl="1"/>
+            <a:r>
+              <a:rPr lang="en-US" dirty="0" smtClean="0"/>
+              <a:t>Research Collaborations</a:t>
+            </a:r>
+          </a:p>
+          <a:p>
+            <a:pPr lvl="1"/>
+            <a:r>
+              <a:rPr lang="en-US" dirty="0" smtClean="0"/>
+              <a:t>Hack-a-thons</a:t>
+            </a:r>
+          </a:p>
+          <a:p>
+            <a:pPr lvl="1"/>
+            <a:r>
+              <a:rPr lang="en-US" dirty="0" smtClean="0"/>
+              <a:t>Coffee &amp; Donuts! </a:t>
+            </a:r>
+          </a:p>
+          <a:p>
+            <a:endParaRPr lang="en-US" dirty="0"/>
+          </a:p>
+          <a:p>
+            <a:r>
+              <a:rPr lang="en-US" dirty="0" smtClean="0"/>
+              <a:t>Email signup form is in the back of the room</a:t>
+            </a:r>
+          </a:p>
+          <a:p>
+            <a:endParaRPr lang="en-US" dirty="0"/>
+          </a:p>
+          <a:p>
+            <a:endParaRPr lang="en-US" dirty="0"/>
+          </a:p>
+        </p:txBody>
+      </p:sp>
+    </p:spTree>
+    <p:extLst>
+      <p:ext uri="{BB962C8B-B14F-4D97-AF65-F5344CB8AC3E}">
+        <p14:creationId xmlns:p14="http://schemas.microsoft.com/office/powerpoint/2010/main" val="3243677561"/>
+      </p:ext>
+    </p:extLst>
+  </p:cSld>
+  <p:clrMapOvr>
+    <a:masterClrMapping/>
+  </p:clrMapOvr>
+</p:sld>
+</file>
+
+<file path=ppt/slides/slide23.xml><?xml version="1.0" encoding="utf-8"?>
 <p:sld xmlns:a="http://schemas.openxmlformats.org/drawingml/2006/main" xmlns:r="http://schemas.openxmlformats.org/officeDocument/2006/relationships" xmlns:p="http://schemas.openxmlformats.org/presentationml/2006/main">
   <p:cSld>
     <p:spTree>

</xml_diff>